<commit_message>
updating the big ppt
</commit_message>
<xml_diff>
--- a/Azure Governance-GC.pptx
+++ b/Azure Governance-GC.pptx
@@ -4810,42 +4810,6 @@
         </a:p>
       </dgm:t>
     </dgm:pt>
-    <dgm:pt modelId="{FDF3842C-72BD-47B5-974A-14BC97EBE390}">
-      <dgm:prSet/>
-      <dgm:spPr/>
-      <dgm:t>
-        <a:bodyPr/>
-        <a:lstStyle/>
-        <a:p>
-          <a:r>
-            <a:rPr lang="en-US" dirty="0"/>
-            <a:t>Manage Subscriptions (change ownership)</a:t>
-          </a:r>
-        </a:p>
-      </dgm:t>
-    </dgm:pt>
-    <dgm:pt modelId="{8C6745B4-7CFE-4D12-9EBF-82846A6A6AAE}" type="parTrans" cxnId="{7B4ADC5A-6E69-451C-A2EC-D538DE4732F0}">
-      <dgm:prSet/>
-      <dgm:spPr/>
-      <dgm:t>
-        <a:bodyPr/>
-        <a:lstStyle/>
-        <a:p>
-          <a:endParaRPr lang="en-US"/>
-        </a:p>
-      </dgm:t>
-    </dgm:pt>
-    <dgm:pt modelId="{F67F53C2-653B-4795-BA4E-986DEEBDADC8}" type="sibTrans" cxnId="{7B4ADC5A-6E69-451C-A2EC-D538DE4732F0}">
-      <dgm:prSet/>
-      <dgm:spPr/>
-      <dgm:t>
-        <a:bodyPr/>
-        <a:lstStyle/>
-        <a:p>
-          <a:endParaRPr lang="en-US"/>
-        </a:p>
-      </dgm:t>
-    </dgm:pt>
     <dgm:pt modelId="{6853CB78-8BDB-4B63-81EA-4F520D881C0F}" type="pres">
       <dgm:prSet presAssocID="{4D99B075-5B8D-41F0-B463-2391E4DAF5BD}" presName="Name0" presStyleCnt="0">
         <dgm:presLayoutVars>
@@ -4935,7 +4899,6 @@
     <dgm:cxn modelId="{85A50305-AF3C-4F0D-A180-BC83C6101C0B}" srcId="{1CEDE794-719B-4E58-80F7-48946D6F4C39}" destId="{6CA302D5-E71C-4B07-A956-A87A48FBE11E}" srcOrd="4" destOrd="0" parTransId="{9A06DA32-4724-4F0D-9CD5-32EBD2C1BE74}" sibTransId="{2BC4B70D-FAE0-4743-9365-421574CB135A}"/>
     <dgm:cxn modelId="{BC313005-6D08-4455-BB47-39907BB03881}" srcId="{1CEDE794-719B-4E58-80F7-48946D6F4C39}" destId="{47FB3728-AA32-4818-9AF0-0E3769526CA9}" srcOrd="7" destOrd="0" parTransId="{6AD6215E-47D8-4FFF-A4C2-9E91C60029A0}" sibTransId="{A8CFC310-3273-4CFC-90A8-B6F6DC85158E}"/>
     <dgm:cxn modelId="{CAEB2122-24C6-4C04-9B66-BE264E9F76F8}" type="presOf" srcId="{B04F25B9-E07B-4DB5-8E65-DE78A8B468CE}" destId="{EA3CD924-AA8D-4D40-801C-2CE03896AA08}" srcOrd="0" destOrd="1" presId="urn:microsoft.com/office/officeart/2005/8/layout/hList1"/>
-    <dgm:cxn modelId="{76BFAE23-BD52-4D01-9D25-95E1A851F8F6}" type="presOf" srcId="{FDF3842C-72BD-47B5-974A-14BC97EBE390}" destId="{39243CDD-24B6-43FE-91F8-C6FA1DF5F73B}" srcOrd="0" destOrd="2" presId="urn:microsoft.com/office/officeart/2005/8/layout/hList1"/>
     <dgm:cxn modelId="{12A91E2E-7633-4DB0-884C-9AC7796A22DE}" srcId="{4D99B075-5B8D-41F0-B463-2391E4DAF5BD}" destId="{8E311BFE-FEA8-40AA-94AA-C531718B3C19}" srcOrd="2" destOrd="0" parTransId="{BEE7A90B-3BA5-489E-B4A6-38893BCD316A}" sibTransId="{5AA8B9C9-042C-4A12-9907-69FA09412143}"/>
     <dgm:cxn modelId="{EA008D61-617C-4D4B-860F-B6A3F4136286}" srcId="{1CEDE794-719B-4E58-80F7-48946D6F4C39}" destId="{B04F25B9-E07B-4DB5-8E65-DE78A8B468CE}" srcOrd="1" destOrd="0" parTransId="{27B7B590-88F9-413B-840F-C670DF8F88FD}" sibTransId="{E44F76D6-6930-4A58-8B13-114643E19C2A}"/>
     <dgm:cxn modelId="{CC191964-0BBD-4F2E-B393-AA1E82A2AC99}" type="presOf" srcId="{DB766A19-E0AE-49E9-84FD-3C5ACA46A5AD}" destId="{39243CDD-24B6-43FE-91F8-C6FA1DF5F73B}" srcOrd="0" destOrd="1" presId="urn:microsoft.com/office/officeart/2005/8/layout/hList1"/>
@@ -4944,7 +4907,6 @@
     <dgm:cxn modelId="{FEC3A669-C5E7-4732-BF61-BF3F1D15BBEA}" srcId="{8E311BFE-FEA8-40AA-94AA-C531718B3C19}" destId="{07E516CC-E9E1-4692-A8CB-F52FBA9C761A}" srcOrd="0" destOrd="0" parTransId="{85D438C4-9C01-419B-8D65-B0114E3438BC}" sibTransId="{45C1FDB9-0E70-4932-848D-C5F2983BCF7A}"/>
     <dgm:cxn modelId="{1124A44A-0CC2-41D4-A995-FE5FCFD5D238}" srcId="{1CEDE794-719B-4E58-80F7-48946D6F4C39}" destId="{7C9FE737-C85F-44D1-95F4-73F1A915E28F}" srcOrd="2" destOrd="0" parTransId="{CFCB3D5D-58E7-4444-AB17-ACD046B9494F}" sibTransId="{4902581D-0D57-407A-A2E6-2A5B546BE130}"/>
     <dgm:cxn modelId="{486C4677-DBC2-4883-8193-AB2528E35C78}" type="presOf" srcId="{815CA2D0-9F97-4AE0-B7DC-D7A26339BD12}" destId="{EA3CD924-AA8D-4D40-801C-2CE03896AA08}" srcOrd="0" destOrd="3" presId="urn:microsoft.com/office/officeart/2005/8/layout/hList1"/>
-    <dgm:cxn modelId="{7B4ADC5A-6E69-451C-A2EC-D538DE4732F0}" srcId="{1ED607FF-3661-425A-AF4F-60A73BEB2917}" destId="{FDF3842C-72BD-47B5-974A-14BC97EBE390}" srcOrd="2" destOrd="0" parTransId="{8C6745B4-7CFE-4D12-9EBF-82846A6A6AAE}" sibTransId="{F67F53C2-653B-4795-BA4E-986DEEBDADC8}"/>
     <dgm:cxn modelId="{5ABD5F7F-01B3-4789-9C85-980185F4605C}" type="presOf" srcId="{1CEDE794-719B-4E58-80F7-48946D6F4C39}" destId="{179A36A7-8940-4968-A15E-8BA9BFD2EADA}" srcOrd="0" destOrd="0" presId="urn:microsoft.com/office/officeart/2005/8/layout/hList1"/>
     <dgm:cxn modelId="{B2EE5084-3141-4094-8FF7-7C550013DA43}" type="presOf" srcId="{F3EC264E-870D-488D-88C1-CFC5E4C109AE}" destId="{EA3CD924-AA8D-4D40-801C-2CE03896AA08}" srcOrd="0" destOrd="6" presId="urn:microsoft.com/office/officeart/2005/8/layout/hList1"/>
     <dgm:cxn modelId="{58B0588E-6BFA-41C6-AAC3-AD1EE63F1DF7}" srcId="{4D99B075-5B8D-41F0-B463-2391E4DAF5BD}" destId="{1ED607FF-3661-425A-AF4F-60A73BEB2917}" srcOrd="1" destOrd="0" parTransId="{6A97A7A7-2E1B-4B7D-8B28-3C6A62AE2A0F}" sibTransId="{AD29A381-936A-49C0-8401-9FAD2DC7DF61}"/>
@@ -8633,24 +8595,6 @@
             <a:t>Enroll in or enable Preview features</a:t>
           </a:r>
         </a:p>
-        <a:p>
-          <a:pPr marL="171450" lvl="1" indent="-171450" algn="l" defTabSz="711200">
-            <a:lnSpc>
-              <a:spcPct val="90000"/>
-            </a:lnSpc>
-            <a:spcBef>
-              <a:spcPct val="0"/>
-            </a:spcBef>
-            <a:spcAft>
-              <a:spcPct val="15000"/>
-            </a:spcAft>
-            <a:buChar char="•"/>
-          </a:pPr>
-          <a:r>
-            <a:rPr lang="en-US" sz="1600" kern="1200" dirty="0"/>
-            <a:t>Manage Subscriptions (change ownership)</a:t>
-          </a:r>
-        </a:p>
       </dsp:txBody>
       <dsp:txXfrm>
         <a:off x="4012895" y="1536561"/>
@@ -12139,7 +12083,7 @@
       <dsp:spPr>
         <a:xfrm>
           <a:off x="0" y="4084399"/>
-          <a:ext cx="2885678" cy="510468"/>
+          <a:ext cx="2882859" cy="510468"/>
         </a:xfrm>
         <a:prstGeom prst="rect">
           <a:avLst/>
@@ -12188,7 +12132,7 @@
       </dsp:txBody>
       <dsp:txXfrm>
         <a:off x="0" y="4084399"/>
-        <a:ext cx="2885678" cy="510468"/>
+        <a:ext cx="2882859" cy="510468"/>
       </dsp:txXfrm>
     </dsp:sp>
     <dsp:sp modelId="{97036220-D694-4088-8546-51B7D7C500AC}">
@@ -12198,8 +12142,8 @@
       </dsp:nvSpPr>
       <dsp:spPr>
         <a:xfrm>
-          <a:off x="2885677" y="3829164"/>
-          <a:ext cx="577135" cy="1020937"/>
+          <a:off x="2882859" y="3829164"/>
+          <a:ext cx="576571" cy="1020937"/>
         </a:xfrm>
         <a:prstGeom prst="leftBrace">
           <a:avLst>
@@ -12241,8 +12185,8 @@
       </dsp:nvSpPr>
       <dsp:spPr>
         <a:xfrm>
-          <a:off x="3693667" y="3829164"/>
-          <a:ext cx="7849044" cy="1020937"/>
+          <a:off x="3690060" y="3829164"/>
+          <a:ext cx="7841379" cy="1020937"/>
         </a:xfrm>
         <a:prstGeom prst="rect">
           <a:avLst/>
@@ -12325,8 +12269,8 @@
         </a:p>
       </dsp:txBody>
       <dsp:txXfrm>
-        <a:off x="3693667" y="3829164"/>
-        <a:ext cx="7849044" cy="1020937"/>
+        <a:off x="3690060" y="3829164"/>
+        <a:ext cx="7841379" cy="1020937"/>
       </dsp:txXfrm>
     </dsp:sp>
   </dsp:spTree>
@@ -19752,7 +19696,7 @@
           <a:p>
             <a:fld id="{08785AD7-566F-4C71-A877-61487786B932}" type="datetimeFigureOut">
               <a:rPr lang="en-US" smtClean="0"/>
-              <a:t>10/31/2017</a:t>
+              <a:t>11/1/2017</a:t>
             </a:fld>
             <a:endParaRPr lang="en-US" dirty="0"/>
           </a:p>
@@ -19917,7 +19861,7 @@
           <a:p>
             <a:fld id="{3AC152BB-29D3-4366-9432-ADC86E136C03}" type="datetimeFigureOut">
               <a:rPr lang="en-US" smtClean="0"/>
-              <a:t>10/31/2017</a:t>
+              <a:t>11/1/2017</a:t>
             </a:fld>
             <a:endParaRPr lang="en-US" dirty="0"/>
           </a:p>
@@ -21407,7 +21351,7 @@
           <a:p>
             <a:fld id="{38EEC551-8CDA-4EB6-89BB-2A86C9F091C8}" type="datetime8">
               <a:rPr lang="en-US" smtClean="0"/>
-              <a:t>10/31/2017 10:39 PM</a:t>
+              <a:t>11/1/2017 10:14 AM</a:t>
             </a:fld>
             <a:endParaRPr lang="en-US" dirty="0"/>
           </a:p>
@@ -23131,7 +23075,7 @@
           <a:p>
             <a:fld id="{38EEC551-8CDA-4EB6-89BB-2A86C9F091C8}" type="datetime8">
               <a:rPr lang="en-US" smtClean="0"/>
-              <a:t>10/31/2017 10:39 PM</a:t>
+              <a:t>11/1/2017 10:14 AM</a:t>
             </a:fld>
             <a:endParaRPr lang="en-US" dirty="0"/>
           </a:p>
@@ -23932,7 +23876,7 @@
           <a:p>
             <a:fld id="{7D10C09F-FCA1-48C8-B40D-42E1045D109E}" type="datetime8">
               <a:rPr lang="en-US" smtClean="0"/>
-              <a:t>10/31/2017 10:39 PM</a:t>
+              <a:t>11/1/2017 10:14 AM</a:t>
             </a:fld>
             <a:endParaRPr lang="en-US" dirty="0"/>
           </a:p>
@@ -24113,7 +24057,7 @@
           <a:p>
             <a:fld id="{38EEC551-8CDA-4EB6-89BB-2A86C9F091C8}" type="datetime8">
               <a:rPr lang="en-US" smtClean="0"/>
-              <a:t>10/31/2017 10:39 PM</a:t>
+              <a:t>11/1/2017 10:14 AM</a:t>
             </a:fld>
             <a:endParaRPr lang="en-US" dirty="0"/>
           </a:p>
@@ -24466,7 +24410,7 @@
           <a:p>
             <a:fld id="{38EEC551-8CDA-4EB6-89BB-2A86C9F091C8}" type="datetime8">
               <a:rPr lang="en-US" smtClean="0"/>
-              <a:t>10/31/2017 10:39 PM</a:t>
+              <a:t>11/1/2017 10:14 AM</a:t>
             </a:fld>
             <a:endParaRPr lang="en-US" dirty="0"/>
           </a:p>
@@ -24654,7 +24598,7 @@
             <a:fld id="{D51B1278-D92B-4AF3-A9C1-71DD298190CE}" type="datetimeFigureOut">
               <a:rPr lang="en-US" smtClean="0"/>
               <a:pPr/>
-              <a:t>10/31/2017</a:t>
+              <a:t>11/1/2017</a:t>
             </a:fld>
             <a:endParaRPr lang="en-US" dirty="0"/>
           </a:p>
@@ -24853,7 +24797,7 @@
             <a:fld id="{D51B1278-D92B-4AF3-A9C1-71DD298190CE}" type="datetimeFigureOut">
               <a:rPr lang="en-US" smtClean="0"/>
               <a:pPr/>
-              <a:t>10/31/2017</a:t>
+              <a:t>11/1/2017</a:t>
             </a:fld>
             <a:endParaRPr lang="en-US" dirty="0"/>
           </a:p>
@@ -39251,7 +39195,7 @@
             <p:ph sz="quarter" idx="10"/>
             <p:extLst>
               <p:ext uri="{D42A27DB-BD31-4B8C-83A1-F6EECF244321}">
-                <p14:modId xmlns:p14="http://schemas.microsoft.com/office/powerpoint/2010/main" val="3478228614"/>
+                <p14:modId xmlns:p14="http://schemas.microsoft.com/office/powerpoint/2010/main" val="2724095821"/>
               </p:ext>
             </p:extLst>
           </p:nvPr>
@@ -44345,15 +44289,6 @@
 </file>
 
 <file path=customXml/item1.xml><?xml version="1.0" encoding="utf-8"?>
-<?mso-contentType ?>
-<FormTemplates xmlns="http://schemas.microsoft.com/sharepoint/v3/contenttype/forms">
-  <Display>DocumentLibraryForm</Display>
-  <Edit>DocumentLibraryForm</Edit>
-  <New>DocumentLibraryForm</New>
-</FormTemplates>
-</file>
-
-<file path=customXml/item2.xml><?xml version="1.0" encoding="utf-8"?>
 <ct:contentTypeSchema xmlns:ct="http://schemas.microsoft.com/office/2006/metadata/contentType" xmlns:ma="http://schemas.microsoft.com/office/2006/metadata/properties/metaAttributes" ct:_="" ma:_="" ma:contentTypeName="Document" ma:contentTypeID="0x010100C08F381963C77D44A6A91469D5845EE5" ma:contentTypeVersion="2" ma:contentTypeDescription="Create a new document." ma:contentTypeScope="" ma:versionID="66290b1f7725e443aa19cdb7b89371b7">
   <xsd:schema xmlns:xsd="http://www.w3.org/2001/XMLSchema" xmlns:xs="http://www.w3.org/2001/XMLSchema" xmlns:p="http://schemas.microsoft.com/office/2006/metadata/properties" xmlns:ns2="c58f79d2-8dd2-43f0-9a03-e1b9f874d667" targetNamespace="http://schemas.microsoft.com/office/2006/metadata/properties" ma:root="true" ma:fieldsID="27a8e9c299bda407fa38b12f0db042eb" ns2:_="">
     <xsd:import namespace="c58f79d2-8dd2-43f0-9a03-e1b9f874d667"/>
@@ -44501,6 +44436,15 @@
 </ct:contentTypeSchema>
 </file>
 
+<file path=customXml/item2.xml><?xml version="1.0" encoding="utf-8"?>
+<?mso-contentType ?>
+<FormTemplates xmlns="http://schemas.microsoft.com/sharepoint/v3/contenttype/forms">
+  <Display>DocumentLibraryForm</Display>
+  <Edit>DocumentLibraryForm</Edit>
+  <New>DocumentLibraryForm</New>
+</FormTemplates>
+</file>
+
 <file path=customXml/item3.xml><?xml version="1.0" encoding="utf-8"?>
 <p:properties xmlns:p="http://schemas.microsoft.com/office/2006/metadata/properties" xmlns:xsi="http://www.w3.org/2001/XMLSchema-instance" xmlns:pc="http://schemas.microsoft.com/office/infopath/2007/PartnerControls">
   <documentManagement/>
@@ -44508,14 +44452,6 @@
 </file>
 
 <file path=customXml/itemProps1.xml><?xml version="1.0" encoding="utf-8"?>
-<ds:datastoreItem xmlns:ds="http://schemas.openxmlformats.org/officeDocument/2006/customXml" ds:itemID="{D98B8685-CAA3-4A1A-8397-DF9971695697}">
-  <ds:schemaRefs>
-    <ds:schemaRef ds:uri="http://schemas.microsoft.com/sharepoint/v3/contenttype/forms"/>
-  </ds:schemaRefs>
-</ds:datastoreItem>
-</file>
-
-<file path=customXml/itemProps2.xml><?xml version="1.0" encoding="utf-8"?>
 <ds:datastoreItem xmlns:ds="http://schemas.openxmlformats.org/officeDocument/2006/customXml" ds:itemID="{AE30008B-22D1-4C3E-A0BE-5BCAFBE11F82}">
   <ds:schemaRefs>
     <ds:schemaRef ds:uri="http://schemas.microsoft.com/office/2006/metadata/contentType"/>
@@ -44529,6 +44465,14 @@
     <ds:schemaRef ds:uri="http://purl.org/dc/elements/1.1/"/>
     <ds:schemaRef ds:uri="http://purl.org/dc/terms/"/>
     <ds:schemaRef ds:uri="http://schemas.microsoft.com/internal/obd"/>
+  </ds:schemaRefs>
+</ds:datastoreItem>
+</file>
+
+<file path=customXml/itemProps2.xml><?xml version="1.0" encoding="utf-8"?>
+<ds:datastoreItem xmlns:ds="http://schemas.openxmlformats.org/officeDocument/2006/customXml" ds:itemID="{D98B8685-CAA3-4A1A-8397-DF9971695697}">
+  <ds:schemaRefs>
+    <ds:schemaRef ds:uri="http://schemas.microsoft.com/sharepoint/v3/contenttype/forms"/>
   </ds:schemaRefs>
 </ds:datastoreItem>
 </file>

</xml_diff>